<commit_message>
core java and webservices
</commit_message>
<xml_diff>
--- a/AngularJS.pptx
+++ b/AngularJS.pptx
@@ -327,7 +327,7 @@
           <a:p>
             <a:fld id="{8F235549-BF0A-4B98-8561-3786244E808C}" type="datetimeFigureOut">
               <a:rPr lang="en-US" smtClean="0"/>
-              <a:t>3/7/2016</a:t>
+              <a:t>3/31/2016</a:t>
             </a:fld>
             <a:endParaRPr lang="en-US"/>
           </a:p>
@@ -527,7 +527,7 @@
           <a:p>
             <a:fld id="{8F235549-BF0A-4B98-8561-3786244E808C}" type="datetimeFigureOut">
               <a:rPr lang="en-US" smtClean="0"/>
-              <a:t>3/7/2016</a:t>
+              <a:t>3/31/2016</a:t>
             </a:fld>
             <a:endParaRPr lang="en-US"/>
           </a:p>
@@ -702,7 +702,7 @@
           <a:p>
             <a:fld id="{8F235549-BF0A-4B98-8561-3786244E808C}" type="datetimeFigureOut">
               <a:rPr lang="en-US" smtClean="0"/>
-              <a:t>3/7/2016</a:t>
+              <a:t>3/31/2016</a:t>
             </a:fld>
             <a:endParaRPr lang="en-US"/>
           </a:p>
@@ -867,7 +867,7 @@
           <a:p>
             <a:fld id="{8F235549-BF0A-4B98-8561-3786244E808C}" type="datetimeFigureOut">
               <a:rPr lang="en-US" smtClean="0"/>
-              <a:t>3/7/2016</a:t>
+              <a:t>3/31/2016</a:t>
             </a:fld>
             <a:endParaRPr lang="en-US"/>
           </a:p>
@@ -1115,7 +1115,7 @@
           <a:p>
             <a:fld id="{8F235549-BF0A-4B98-8561-3786244E808C}" type="datetimeFigureOut">
               <a:rPr lang="en-US" smtClean="0"/>
-              <a:t>3/7/2016</a:t>
+              <a:t>3/31/2016</a:t>
             </a:fld>
             <a:endParaRPr lang="en-US"/>
           </a:p>
@@ -1433,7 +1433,7 @@
           <a:p>
             <a:fld id="{8F235549-BF0A-4B98-8561-3786244E808C}" type="datetimeFigureOut">
               <a:rPr lang="en-US" smtClean="0"/>
-              <a:t>3/7/2016</a:t>
+              <a:t>3/31/2016</a:t>
             </a:fld>
             <a:endParaRPr lang="en-US"/>
           </a:p>
@@ -1899,7 +1899,7 @@
           <a:p>
             <a:fld id="{8F235549-BF0A-4B98-8561-3786244E808C}" type="datetimeFigureOut">
               <a:rPr lang="en-US" smtClean="0"/>
-              <a:t>3/7/2016</a:t>
+              <a:t>3/31/2016</a:t>
             </a:fld>
             <a:endParaRPr lang="en-US"/>
           </a:p>
@@ -2047,7 +2047,7 @@
           <a:p>
             <a:fld id="{8F235549-BF0A-4B98-8561-3786244E808C}" type="datetimeFigureOut">
               <a:rPr lang="en-US" smtClean="0"/>
-              <a:t>3/7/2016</a:t>
+              <a:t>3/31/2016</a:t>
             </a:fld>
             <a:endParaRPr lang="en-US"/>
           </a:p>
@@ -2137,7 +2137,7 @@
           <a:p>
             <a:fld id="{8F235549-BF0A-4B98-8561-3786244E808C}" type="datetimeFigureOut">
               <a:rPr lang="en-US" smtClean="0"/>
-              <a:t>3/7/2016</a:t>
+              <a:t>3/31/2016</a:t>
             </a:fld>
             <a:endParaRPr lang="en-US"/>
           </a:p>
@@ -2411,7 +2411,7 @@
           <a:p>
             <a:fld id="{8F235549-BF0A-4B98-8561-3786244E808C}" type="datetimeFigureOut">
               <a:rPr lang="en-US" smtClean="0"/>
-              <a:t>3/7/2016</a:t>
+              <a:t>3/31/2016</a:t>
             </a:fld>
             <a:endParaRPr lang="en-US"/>
           </a:p>
@@ -2716,7 +2716,7 @@
           <a:p>
             <a:fld id="{8F235549-BF0A-4B98-8561-3786244E808C}" type="datetimeFigureOut">
               <a:rPr lang="en-US" smtClean="0"/>
-              <a:t>3/7/2016</a:t>
+              <a:t>3/31/2016</a:t>
             </a:fld>
             <a:endParaRPr lang="en-US"/>
           </a:p>
@@ -3014,7 +3014,7 @@
           <a:p>
             <a:fld id="{8F235549-BF0A-4B98-8561-3786244E808C}" type="datetimeFigureOut">
               <a:rPr lang="en-US" smtClean="0"/>
-              <a:t>3/7/2016</a:t>
+              <a:t>3/31/2016</a:t>
             </a:fld>
             <a:endParaRPr lang="en-US"/>
           </a:p>

</xml_diff>